<commit_message>
use case document added
</commit_message>
<xml_diff>
--- a/DatabaseLayout.pptx
+++ b/DatabaseLayout.pptx
@@ -3357,7 +3357,7 @@
             <a:pPr algn="ctr"/>
             <a:r>
               <a:rPr lang="en-US" dirty="0"/>
-              <a:t>Database Layout #1</a:t>
+              <a:t>Database Layout #2</a:t>
             </a:r>
           </a:p>
         </p:txBody>
@@ -5062,14 +5062,14 @@
           <p:nvPr>
             <p:extLst>
               <p:ext uri="{D42A27DB-BD31-4B8C-83A1-F6EECF244321}">
-                <p14:modId xmlns:p14="http://schemas.microsoft.com/office/powerpoint/2010/main" val="951604200"/>
+                <p14:modId xmlns:p14="http://schemas.microsoft.com/office/powerpoint/2010/main" val="852889664"/>
               </p:ext>
             </p:extLst>
           </p:nvPr>
         </p:nvGraphicFramePr>
         <p:xfrm>
           <a:off x="6763660" y="229774"/>
-          <a:ext cx="4034972" cy="2560320"/>
+          <a:ext cx="4034972" cy="2926080"/>
         </p:xfrm>
         <a:graphic>
           <a:graphicData uri="http://schemas.openxmlformats.org/drawingml/2006/table">
@@ -5759,6 +5759,107 @@
                   </a:ext>
                 </a:extLst>
               </a:tr>
+              <a:tr h="278675">
+                <a:tc>
+                  <a:txBody>
+                    <a:bodyPr/>
+                    <a:lstStyle/>
+                    <a:p>
+                      <a:r>
+                        <a:rPr lang="en-US" dirty="0"/>
+                        <a:t>Picture</a:t>
+                      </a:r>
+                    </a:p>
+                  </a:txBody>
+                  <a:tcPr>
+                    <a:lnL w="12700" cap="flat" cmpd="sng" algn="ctr">
+                      <a:solidFill>
+                        <a:schemeClr val="tx1"/>
+                      </a:solidFill>
+                      <a:prstDash val="solid"/>
+                      <a:round/>
+                      <a:headEnd type="none" w="med" len="med"/>
+                      <a:tailEnd type="none" w="med" len="med"/>
+                    </a:lnL>
+                    <a:lnR w="12700" cap="flat" cmpd="sng" algn="ctr">
+                      <a:solidFill>
+                        <a:schemeClr val="tx1"/>
+                      </a:solidFill>
+                      <a:prstDash val="solid"/>
+                      <a:round/>
+                      <a:headEnd type="none" w="med" len="med"/>
+                      <a:tailEnd type="none" w="med" len="med"/>
+                    </a:lnR>
+                    <a:lnT w="12700" cmpd="sng">
+                      <a:solidFill>
+                        <a:schemeClr val="tx1"/>
+                      </a:solidFill>
+                      <a:prstDash val="solid"/>
+                    </a:lnT>
+                    <a:lnB w="12700" cap="flat" cmpd="sng" algn="ctr">
+                      <a:solidFill>
+                        <a:schemeClr val="tx1"/>
+                      </a:solidFill>
+                      <a:prstDash val="solid"/>
+                      <a:round/>
+                      <a:headEnd type="none" w="med" len="med"/>
+                      <a:tailEnd type="none" w="med" len="med"/>
+                    </a:lnB>
+                  </a:tcPr>
+                </a:tc>
+                <a:tc>
+                  <a:txBody>
+                    <a:bodyPr/>
+                    <a:lstStyle/>
+                    <a:p>
+                      <a:r>
+                        <a:rPr lang="en-US" dirty="0"/>
+                        <a:t>picture</a:t>
+                      </a:r>
+                    </a:p>
+                  </a:txBody>
+                  <a:tcPr>
+                    <a:lnL w="12700" cap="flat" cmpd="sng" algn="ctr">
+                      <a:solidFill>
+                        <a:schemeClr val="tx1"/>
+                      </a:solidFill>
+                      <a:prstDash val="solid"/>
+                      <a:round/>
+                      <a:headEnd type="none" w="med" len="med"/>
+                      <a:tailEnd type="none" w="med" len="med"/>
+                    </a:lnL>
+                    <a:lnR w="12700" cmpd="sng">
+                      <a:solidFill>
+                        <a:schemeClr val="tx1"/>
+                      </a:solidFill>
+                      <a:prstDash val="solid"/>
+                    </a:lnR>
+                    <a:lnT w="12700" cap="flat" cmpd="sng" algn="ctr">
+                      <a:solidFill>
+                        <a:schemeClr val="tx1"/>
+                      </a:solidFill>
+                      <a:prstDash val="solid"/>
+                      <a:round/>
+                      <a:headEnd type="none" w="med" len="med"/>
+                      <a:tailEnd type="none" w="med" len="med"/>
+                    </a:lnT>
+                    <a:lnB w="12700" cap="flat" cmpd="sng" algn="ctr">
+                      <a:solidFill>
+                        <a:schemeClr val="tx1"/>
+                      </a:solidFill>
+                      <a:prstDash val="solid"/>
+                      <a:round/>
+                      <a:headEnd type="none" w="med" len="med"/>
+                      <a:tailEnd type="none" w="med" len="med"/>
+                    </a:lnB>
+                  </a:tcPr>
+                </a:tc>
+                <a:extLst>
+                  <a:ext uri="{0D108BD9-81ED-4DB2-BD59-A6C34878D82A}">
+                    <a16:rowId xmlns:a16="http://schemas.microsoft.com/office/drawing/2014/main" val="1899465311"/>
+                  </a:ext>
+                </a:extLst>
+              </a:tr>
             </a:tbl>
           </a:graphicData>
         </a:graphic>
@@ -5778,14 +5879,14 @@
           <p:nvPr>
             <p:extLst>
               <p:ext uri="{D42A27DB-BD31-4B8C-83A1-F6EECF244321}">
-                <p14:modId xmlns:p14="http://schemas.microsoft.com/office/powerpoint/2010/main" val="99261000"/>
+                <p14:modId xmlns:p14="http://schemas.microsoft.com/office/powerpoint/2010/main" val="1294729369"/>
               </p:ext>
             </p:extLst>
           </p:nvPr>
         </p:nvGraphicFramePr>
         <p:xfrm>
-          <a:off x="6763660" y="2974760"/>
-          <a:ext cx="4034972" cy="3840480"/>
+          <a:off x="6763660" y="3344203"/>
+          <a:ext cx="4034972" cy="3605237"/>
         </p:xfrm>
         <a:graphic>
           <a:graphicData uri="http://schemas.openxmlformats.org/drawingml/2006/table">
@@ -5807,7 +5908,7 @@
                   </a:extLst>
                 </a:gridCol>
               </a:tblGrid>
-              <a:tr h="0">
+              <a:tr h="179084">
                 <a:tc gridSpan="2">
                   <a:txBody>
                     <a:bodyPr/>
@@ -5869,7 +5970,7 @@
                   </a:ext>
                 </a:extLst>
               </a:tr>
-              <a:tr h="0">
+              <a:tr h="313397">
                 <a:tc gridSpan="2">
                   <a:txBody>
                     <a:bodyPr/>
@@ -5877,7 +5978,7 @@
                     <a:p>
                       <a:pPr algn="ctr"/>
                       <a:r>
-                        <a:rPr lang="en-US" dirty="0"/>
+                        <a:rPr lang="en-US" sz="1100" dirty="0"/>
                         <a:t>SQL AGENT will run and delete any completed jobs after 7 days</a:t>
                       </a:r>
                     </a:p>
@@ -5934,7 +6035,7 @@
                   </a:ext>
                 </a:extLst>
               </a:tr>
-              <a:tr h="278675">
+              <a:tr h="179084">
                 <a:tc>
                   <a:txBody>
                     <a:bodyPr/>
@@ -6035,7 +6136,7 @@
                   </a:ext>
                 </a:extLst>
               </a:tr>
-              <a:tr h="278675">
+              <a:tr h="179084">
                 <a:tc>
                   <a:txBody>
                     <a:bodyPr/>
@@ -6136,7 +6237,7 @@
                   </a:ext>
                 </a:extLst>
               </a:tr>
-              <a:tr h="278675">
+              <a:tr h="179084">
                 <a:tc>
                   <a:txBody>
                     <a:bodyPr/>
@@ -6237,7 +6338,7 @@
                   </a:ext>
                 </a:extLst>
               </a:tr>
-              <a:tr h="278675">
+              <a:tr h="179084">
                 <a:tc>
                   <a:txBody>
                     <a:bodyPr/>
@@ -6338,7 +6439,7 @@
                   </a:ext>
                 </a:extLst>
               </a:tr>
-              <a:tr h="278675">
+              <a:tr h="179084">
                 <a:tc>
                   <a:txBody>
                     <a:bodyPr/>
@@ -6439,7 +6540,7 @@
                   </a:ext>
                 </a:extLst>
               </a:tr>
-              <a:tr h="278675">
+              <a:tr h="179084">
                 <a:tc>
                   <a:txBody>
                     <a:bodyPr/>
@@ -6540,14 +6641,14 @@
                   </a:ext>
                 </a:extLst>
               </a:tr>
-              <a:tr h="278675">
+              <a:tr h="313397">
                 <a:tc>
                   <a:txBody>
                     <a:bodyPr/>
                     <a:lstStyle/>
                     <a:p>
                       <a:r>
-                        <a:rPr lang="en-US" dirty="0"/>
+                        <a:rPr lang="en-US" sz="1600" dirty="0"/>
                         <a:t>Days since completed</a:t>
                       </a:r>
                     </a:p>
@@ -6638,6 +6739,107 @@
                 <a:extLst>
                   <a:ext uri="{0D108BD9-81ED-4DB2-BD59-A6C34878D82A}">
                     <a16:rowId xmlns:a16="http://schemas.microsoft.com/office/drawing/2014/main" val="1721946676"/>
+                  </a:ext>
+                </a:extLst>
+              </a:tr>
+              <a:tr h="313397">
+                <a:tc>
+                  <a:txBody>
+                    <a:bodyPr/>
+                    <a:lstStyle/>
+                    <a:p>
+                      <a:r>
+                        <a:rPr lang="en-US" sz="1600" dirty="0"/>
+                        <a:t>Picture </a:t>
+                      </a:r>
+                    </a:p>
+                  </a:txBody>
+                  <a:tcPr>
+                    <a:lnL w="12700" cap="flat" cmpd="sng" algn="ctr">
+                      <a:solidFill>
+                        <a:schemeClr val="tx1"/>
+                      </a:solidFill>
+                      <a:prstDash val="solid"/>
+                      <a:round/>
+                      <a:headEnd type="none" w="med" len="med"/>
+                      <a:tailEnd type="none" w="med" len="med"/>
+                    </a:lnL>
+                    <a:lnR w="12700" cap="flat" cmpd="sng" algn="ctr">
+                      <a:solidFill>
+                        <a:schemeClr val="tx1"/>
+                      </a:solidFill>
+                      <a:prstDash val="solid"/>
+                      <a:round/>
+                      <a:headEnd type="none" w="med" len="med"/>
+                      <a:tailEnd type="none" w="med" len="med"/>
+                    </a:lnR>
+                    <a:lnT w="12700" cmpd="sng">
+                      <a:solidFill>
+                        <a:schemeClr val="tx1"/>
+                      </a:solidFill>
+                      <a:prstDash val="solid"/>
+                    </a:lnT>
+                    <a:lnB w="12700" cap="flat" cmpd="sng" algn="ctr">
+                      <a:solidFill>
+                        <a:schemeClr val="tx1"/>
+                      </a:solidFill>
+                      <a:prstDash val="solid"/>
+                      <a:round/>
+                      <a:headEnd type="none" w="med" len="med"/>
+                      <a:tailEnd type="none" w="med" len="med"/>
+                    </a:lnB>
+                  </a:tcPr>
+                </a:tc>
+                <a:tc>
+                  <a:txBody>
+                    <a:bodyPr/>
+                    <a:lstStyle/>
+                    <a:p>
+                      <a:r>
+                        <a:rPr lang="en-US" dirty="0"/>
+                        <a:t>picture</a:t>
+                      </a:r>
+                    </a:p>
+                  </a:txBody>
+                  <a:tcPr>
+                    <a:lnL w="12700" cap="flat" cmpd="sng" algn="ctr">
+                      <a:solidFill>
+                        <a:schemeClr val="tx1"/>
+                      </a:solidFill>
+                      <a:prstDash val="solid"/>
+                      <a:round/>
+                      <a:headEnd type="none" w="med" len="med"/>
+                      <a:tailEnd type="none" w="med" len="med"/>
+                    </a:lnL>
+                    <a:lnR w="12700" cmpd="sng">
+                      <a:solidFill>
+                        <a:schemeClr val="tx1"/>
+                      </a:solidFill>
+                      <a:prstDash val="solid"/>
+                    </a:lnR>
+                    <a:lnT w="12700" cap="flat" cmpd="sng" algn="ctr">
+                      <a:solidFill>
+                        <a:schemeClr val="tx1"/>
+                      </a:solidFill>
+                      <a:prstDash val="solid"/>
+                      <a:round/>
+                      <a:headEnd type="none" w="med" len="med"/>
+                      <a:tailEnd type="none" w="med" len="med"/>
+                    </a:lnT>
+                    <a:lnB w="12700" cap="flat" cmpd="sng" algn="ctr">
+                      <a:solidFill>
+                        <a:schemeClr val="tx1"/>
+                      </a:solidFill>
+                      <a:prstDash val="solid"/>
+                      <a:round/>
+                      <a:headEnd type="none" w="med" len="med"/>
+                      <a:tailEnd type="none" w="med" len="med"/>
+                    </a:lnB>
+                  </a:tcPr>
+                </a:tc>
+                <a:extLst>
+                  <a:ext uri="{0D108BD9-81ED-4DB2-BD59-A6C34878D82A}">
+                    <a16:rowId xmlns:a16="http://schemas.microsoft.com/office/drawing/2014/main" val="3160021839"/>
                   </a:ext>
                 </a:extLst>
               </a:tr>

</xml_diff>

<commit_message>
ListView works for each catagory with swapping, edited database layout
</commit_message>
<xml_diff>
--- a/DatabaseLayout.pptx
+++ b/DatabaseLayout.pptx
@@ -259,7 +259,7 @@
           <a:p>
             <a:fld id="{F57843D7-FDC0-49F1-8B96-6F56F6386BB0}" type="datetimeFigureOut">
               <a:rPr lang="en-US" smtClean="0"/>
-              <a:t>8/1/2020</a:t>
+              <a:t>1/13/2021</a:t>
             </a:fld>
             <a:endParaRPr lang="en-US"/>
           </a:p>
@@ -457,7 +457,7 @@
           <a:p>
             <a:fld id="{F57843D7-FDC0-49F1-8B96-6F56F6386BB0}" type="datetimeFigureOut">
               <a:rPr lang="en-US" smtClean="0"/>
-              <a:t>8/1/2020</a:t>
+              <a:t>1/13/2021</a:t>
             </a:fld>
             <a:endParaRPr lang="en-US"/>
           </a:p>
@@ -665,7 +665,7 @@
           <a:p>
             <a:fld id="{F57843D7-FDC0-49F1-8B96-6F56F6386BB0}" type="datetimeFigureOut">
               <a:rPr lang="en-US" smtClean="0"/>
-              <a:t>8/1/2020</a:t>
+              <a:t>1/13/2021</a:t>
             </a:fld>
             <a:endParaRPr lang="en-US"/>
           </a:p>
@@ -863,7 +863,7 @@
           <a:p>
             <a:fld id="{F57843D7-FDC0-49F1-8B96-6F56F6386BB0}" type="datetimeFigureOut">
               <a:rPr lang="en-US" smtClean="0"/>
-              <a:t>8/1/2020</a:t>
+              <a:t>1/13/2021</a:t>
             </a:fld>
             <a:endParaRPr lang="en-US"/>
           </a:p>
@@ -1138,7 +1138,7 @@
           <a:p>
             <a:fld id="{F57843D7-FDC0-49F1-8B96-6F56F6386BB0}" type="datetimeFigureOut">
               <a:rPr lang="en-US" smtClean="0"/>
-              <a:t>8/1/2020</a:t>
+              <a:t>1/13/2021</a:t>
             </a:fld>
             <a:endParaRPr lang="en-US"/>
           </a:p>
@@ -1403,7 +1403,7 @@
           <a:p>
             <a:fld id="{F57843D7-FDC0-49F1-8B96-6F56F6386BB0}" type="datetimeFigureOut">
               <a:rPr lang="en-US" smtClean="0"/>
-              <a:t>8/1/2020</a:t>
+              <a:t>1/13/2021</a:t>
             </a:fld>
             <a:endParaRPr lang="en-US"/>
           </a:p>
@@ -1815,7 +1815,7 @@
           <a:p>
             <a:fld id="{F57843D7-FDC0-49F1-8B96-6F56F6386BB0}" type="datetimeFigureOut">
               <a:rPr lang="en-US" smtClean="0"/>
-              <a:t>8/1/2020</a:t>
+              <a:t>1/13/2021</a:t>
             </a:fld>
             <a:endParaRPr lang="en-US"/>
           </a:p>
@@ -1956,7 +1956,7 @@
           <a:p>
             <a:fld id="{F57843D7-FDC0-49F1-8B96-6F56F6386BB0}" type="datetimeFigureOut">
               <a:rPr lang="en-US" smtClean="0"/>
-              <a:t>8/1/2020</a:t>
+              <a:t>1/13/2021</a:t>
             </a:fld>
             <a:endParaRPr lang="en-US"/>
           </a:p>
@@ -2069,7 +2069,7 @@
           <a:p>
             <a:fld id="{F57843D7-FDC0-49F1-8B96-6F56F6386BB0}" type="datetimeFigureOut">
               <a:rPr lang="en-US" smtClean="0"/>
-              <a:t>8/1/2020</a:t>
+              <a:t>1/13/2021</a:t>
             </a:fld>
             <a:endParaRPr lang="en-US"/>
           </a:p>
@@ -2380,7 +2380,7 @@
           <a:p>
             <a:fld id="{F57843D7-FDC0-49F1-8B96-6F56F6386BB0}" type="datetimeFigureOut">
               <a:rPr lang="en-US" smtClean="0"/>
-              <a:t>8/1/2020</a:t>
+              <a:t>1/13/2021</a:t>
             </a:fld>
             <a:endParaRPr lang="en-US"/>
           </a:p>
@@ -2668,7 +2668,7 @@
           <a:p>
             <a:fld id="{F57843D7-FDC0-49F1-8B96-6F56F6386BB0}" type="datetimeFigureOut">
               <a:rPr lang="en-US" smtClean="0"/>
-              <a:t>8/1/2020</a:t>
+              <a:t>1/13/2021</a:t>
             </a:fld>
             <a:endParaRPr lang="en-US"/>
           </a:p>
@@ -2909,7 +2909,7 @@
           <a:p>
             <a:fld id="{F57843D7-FDC0-49F1-8B96-6F56F6386BB0}" type="datetimeFigureOut">
               <a:rPr lang="en-US" smtClean="0"/>
-              <a:t>8/1/2020</a:t>
+              <a:t>1/13/2021</a:t>
             </a:fld>
             <a:endParaRPr lang="en-US"/>
           </a:p>
@@ -5062,14 +5062,14 @@
           <p:nvPr>
             <p:extLst>
               <p:ext uri="{D42A27DB-BD31-4B8C-83A1-F6EECF244321}">
-                <p14:modId xmlns:p14="http://schemas.microsoft.com/office/powerpoint/2010/main" val="852889664"/>
+                <p14:modId xmlns:p14="http://schemas.microsoft.com/office/powerpoint/2010/main" val="4066872280"/>
               </p:ext>
             </p:extLst>
           </p:nvPr>
         </p:nvGraphicFramePr>
         <p:xfrm>
           <a:off x="6763660" y="229774"/>
-          <a:ext cx="4034972" cy="2926080"/>
+          <a:ext cx="4034972" cy="3291840"/>
         </p:xfrm>
         <a:graphic>
           <a:graphicData uri="http://schemas.openxmlformats.org/drawingml/2006/table">
@@ -5860,797 +5860,17 @@
                   </a:ext>
                 </a:extLst>
               </a:tr>
-            </a:tbl>
-          </a:graphicData>
-        </a:graphic>
-      </p:graphicFrame>
-      <p:graphicFrame>
-        <p:nvGraphicFramePr>
-          <p:cNvPr id="6" name="Table 5">
-            <a:extLst>
-              <a:ext uri="{FF2B5EF4-FFF2-40B4-BE49-F238E27FC236}">
-                <a16:creationId xmlns:a16="http://schemas.microsoft.com/office/drawing/2014/main" id="{A61A9C35-0B58-4FD4-A511-1F8CEE2D7384}"/>
-              </a:ext>
-            </a:extLst>
-          </p:cNvPr>
-          <p:cNvGraphicFramePr>
-            <a:graphicFrameLocks noGrp="1"/>
-          </p:cNvGraphicFramePr>
-          <p:nvPr>
-            <p:extLst>
-              <p:ext uri="{D42A27DB-BD31-4B8C-83A1-F6EECF244321}">
-                <p14:modId xmlns:p14="http://schemas.microsoft.com/office/powerpoint/2010/main" val="1294729369"/>
-              </p:ext>
-            </p:extLst>
-          </p:nvPr>
-        </p:nvGraphicFramePr>
-        <p:xfrm>
-          <a:off x="6763660" y="3344203"/>
-          <a:ext cx="4034972" cy="3605237"/>
-        </p:xfrm>
-        <a:graphic>
-          <a:graphicData uri="http://schemas.openxmlformats.org/drawingml/2006/table">
-            <a:tbl>
-              <a:tblPr firstRow="1"/>
-              <a:tblGrid>
-                <a:gridCol w="2017486">
-                  <a:extLst>
-                    <a:ext uri="{9D8B030D-6E8A-4147-A177-3AD203B41FA5}">
-                      <a16:colId xmlns:a16="http://schemas.microsoft.com/office/drawing/2014/main" val="275472486"/>
-                    </a:ext>
-                  </a:extLst>
-                </a:gridCol>
-                <a:gridCol w="2017486">
-                  <a:extLst>
-                    <a:ext uri="{9D8B030D-6E8A-4147-A177-3AD203B41FA5}">
-                      <a16:colId xmlns:a16="http://schemas.microsoft.com/office/drawing/2014/main" val="3616602679"/>
-                    </a:ext>
-                  </a:extLst>
-                </a:gridCol>
-              </a:tblGrid>
-              <a:tr h="179084">
-                <a:tc gridSpan="2">
-                  <a:txBody>
-                    <a:bodyPr/>
-                    <a:lstStyle/>
-                    <a:p>
-                      <a:pPr algn="ctr"/>
-                      <a:r>
-                        <a:rPr lang="en-US" dirty="0"/>
-                        <a:t>Completed chores</a:t>
-                      </a:r>
-                    </a:p>
-                  </a:txBody>
-                  <a:tcPr>
-                    <a:lnL w="12700" cap="flat" cmpd="sng" algn="ctr">
-                      <a:solidFill>
-                        <a:schemeClr val="tx1"/>
-                      </a:solidFill>
-                      <a:prstDash val="solid"/>
-                      <a:round/>
-                      <a:headEnd type="none" w="med" len="med"/>
-                      <a:tailEnd type="none" w="med" len="med"/>
-                    </a:lnL>
-                    <a:lnR w="12700" cmpd="sng">
-                      <a:solidFill>
-                        <a:schemeClr val="tx1"/>
-                      </a:solidFill>
-                      <a:prstDash val="solid"/>
-                    </a:lnR>
-                    <a:lnT w="12700" cmpd="sng">
-                      <a:solidFill>
-                        <a:schemeClr val="tx1"/>
-                      </a:solidFill>
-                      <a:prstDash val="solid"/>
-                    </a:lnT>
-                    <a:lnB w="12700" cap="flat" cmpd="sng" algn="ctr">
-                      <a:solidFill>
-                        <a:schemeClr val="tx1"/>
-                      </a:solidFill>
-                      <a:prstDash val="solid"/>
-                      <a:round/>
-                      <a:headEnd type="none" w="med" len="med"/>
-                      <a:tailEnd type="none" w="med" len="med"/>
-                    </a:lnB>
-                  </a:tcPr>
-                </a:tc>
-                <a:tc hMerge="1">
-                  <a:txBody>
-                    <a:bodyPr/>
-                    <a:lstStyle/>
-                    <a:p>
-                      <a:endParaRPr lang="en-US"/>
-                    </a:p>
-                  </a:txBody>
-                  <a:tcPr/>
-                </a:tc>
-                <a:extLst>
-                  <a:ext uri="{0D108BD9-81ED-4DB2-BD59-A6C34878D82A}">
-                    <a16:rowId xmlns:a16="http://schemas.microsoft.com/office/drawing/2014/main" val="722287977"/>
-                  </a:ext>
-                </a:extLst>
-              </a:tr>
-              <a:tr h="313397">
-                <a:tc gridSpan="2">
-                  <a:txBody>
-                    <a:bodyPr/>
-                    <a:lstStyle/>
-                    <a:p>
-                      <a:pPr algn="ctr"/>
-                      <a:r>
-                        <a:rPr lang="en-US" sz="1100" dirty="0"/>
-                        <a:t>SQL AGENT will run and delete any completed jobs after 7 days</a:t>
-                      </a:r>
-                    </a:p>
-                  </a:txBody>
-                  <a:tcPr>
-                    <a:lnL w="12700" cap="flat" cmpd="sng" algn="ctr">
-                      <a:solidFill>
-                        <a:schemeClr val="tx1"/>
-                      </a:solidFill>
-                      <a:prstDash val="solid"/>
-                      <a:round/>
-                      <a:headEnd type="none" w="med" len="med"/>
-                      <a:tailEnd type="none" w="med" len="med"/>
-                    </a:lnL>
-                    <a:lnR w="12700" cmpd="sng">
-                      <a:solidFill>
-                        <a:schemeClr val="tx1"/>
-                      </a:solidFill>
-                      <a:prstDash val="solid"/>
-                    </a:lnR>
-                    <a:lnT w="12700" cap="flat" cmpd="sng" algn="ctr">
-                      <a:solidFill>
-                        <a:schemeClr val="tx1"/>
-                      </a:solidFill>
-                      <a:prstDash val="solid"/>
-                      <a:round/>
-                      <a:headEnd type="none" w="med" len="med"/>
-                      <a:tailEnd type="none" w="med" len="med"/>
-                    </a:lnT>
-                    <a:lnB w="12700" cap="flat" cmpd="sng" algn="ctr">
-                      <a:solidFill>
-                        <a:schemeClr val="tx1"/>
-                      </a:solidFill>
-                      <a:prstDash val="solid"/>
-                      <a:round/>
-                      <a:headEnd type="none" w="med" len="med"/>
-                      <a:tailEnd type="none" w="med" len="med"/>
-                    </a:lnB>
-                  </a:tcPr>
-                </a:tc>
-                <a:tc hMerge="1">
-                  <a:txBody>
-                    <a:bodyPr/>
-                    <a:lstStyle/>
-                    <a:p>
-                      <a:endParaRPr lang="en-US"/>
-                    </a:p>
-                  </a:txBody>
-                  <a:tcPr/>
-                </a:tc>
-                <a:extLst>
-                  <a:ext uri="{0D108BD9-81ED-4DB2-BD59-A6C34878D82A}">
-                    <a16:rowId xmlns:a16="http://schemas.microsoft.com/office/drawing/2014/main" val="1057441126"/>
-                  </a:ext>
-                </a:extLst>
-              </a:tr>
-              <a:tr h="179084">
+              <a:tr h="278675">
                 <a:tc>
                   <a:txBody>
                     <a:bodyPr/>
                     <a:lstStyle/>
                     <a:p>
                       <a:r>
-                        <a:rPr lang="en-US" dirty="0"/>
-                        <a:t>ID</a:t>
+                        <a:rPr lang="en-US" dirty="0" err="1"/>
+                        <a:t>CompletedID</a:t>
                       </a:r>
-                    </a:p>
-                  </a:txBody>
-                  <a:tcPr>
-                    <a:lnL w="12700" cap="flat" cmpd="sng" algn="ctr">
-                      <a:solidFill>
-                        <a:schemeClr val="tx1"/>
-                      </a:solidFill>
-                      <a:prstDash val="solid"/>
-                      <a:round/>
-                      <a:headEnd type="none" w="med" len="med"/>
-                      <a:tailEnd type="none" w="med" len="med"/>
-                    </a:lnL>
-                    <a:lnR w="12700" cap="flat" cmpd="sng" algn="ctr">
-                      <a:solidFill>
-                        <a:schemeClr val="tx1"/>
-                      </a:solidFill>
-                      <a:prstDash val="solid"/>
-                      <a:round/>
-                      <a:headEnd type="none" w="med" len="med"/>
-                      <a:tailEnd type="none" w="med" len="med"/>
-                    </a:lnR>
-                    <a:lnT w="12700" cmpd="sng">
-                      <a:solidFill>
-                        <a:schemeClr val="tx1"/>
-                      </a:solidFill>
-                      <a:prstDash val="solid"/>
-                    </a:lnT>
-                    <a:lnB w="12700" cap="flat" cmpd="sng" algn="ctr">
-                      <a:solidFill>
-                        <a:schemeClr val="tx1"/>
-                      </a:solidFill>
-                      <a:prstDash val="solid"/>
-                      <a:round/>
-                      <a:headEnd type="none" w="med" len="med"/>
-                      <a:tailEnd type="none" w="med" len="med"/>
-                    </a:lnB>
-                  </a:tcPr>
-                </a:tc>
-                <a:tc>
-                  <a:txBody>
-                    <a:bodyPr/>
-                    <a:lstStyle/>
-                    <a:p>
-                      <a:r>
-                        <a:rPr lang="en-US" dirty="0"/>
-                        <a:t>Unique int</a:t>
-                      </a:r>
-                    </a:p>
-                  </a:txBody>
-                  <a:tcPr>
-                    <a:lnL w="12700" cap="flat" cmpd="sng" algn="ctr">
-                      <a:solidFill>
-                        <a:schemeClr val="tx1"/>
-                      </a:solidFill>
-                      <a:prstDash val="solid"/>
-                      <a:round/>
-                      <a:headEnd type="none" w="med" len="med"/>
-                      <a:tailEnd type="none" w="med" len="med"/>
-                    </a:lnL>
-                    <a:lnR w="12700" cmpd="sng">
-                      <a:solidFill>
-                        <a:schemeClr val="tx1"/>
-                      </a:solidFill>
-                      <a:prstDash val="solid"/>
-                    </a:lnR>
-                    <a:lnT w="12700" cap="flat" cmpd="sng" algn="ctr">
-                      <a:solidFill>
-                        <a:schemeClr val="tx1"/>
-                      </a:solidFill>
-                      <a:prstDash val="solid"/>
-                      <a:round/>
-                      <a:headEnd type="none" w="med" len="med"/>
-                      <a:tailEnd type="none" w="med" len="med"/>
-                    </a:lnT>
-                    <a:lnB w="12700" cap="flat" cmpd="sng" algn="ctr">
-                      <a:solidFill>
-                        <a:schemeClr val="tx1"/>
-                      </a:solidFill>
-                      <a:prstDash val="solid"/>
-                      <a:round/>
-                      <a:headEnd type="none" w="med" len="med"/>
-                      <a:tailEnd type="none" w="med" len="med"/>
-                    </a:lnB>
-                  </a:tcPr>
-                </a:tc>
-                <a:extLst>
-                  <a:ext uri="{0D108BD9-81ED-4DB2-BD59-A6C34878D82A}">
-                    <a16:rowId xmlns:a16="http://schemas.microsoft.com/office/drawing/2014/main" val="1642646306"/>
-                  </a:ext>
-                </a:extLst>
-              </a:tr>
-              <a:tr h="179084">
-                <a:tc>
-                  <a:txBody>
-                    <a:bodyPr/>
-                    <a:lstStyle/>
-                    <a:p>
-                      <a:r>
-                        <a:rPr lang="en-US" dirty="0"/>
-                        <a:t>Parents ID</a:t>
-                      </a:r>
-                    </a:p>
-                  </a:txBody>
-                  <a:tcPr>
-                    <a:lnL w="12700" cap="flat" cmpd="sng" algn="ctr">
-                      <a:solidFill>
-                        <a:schemeClr val="tx1"/>
-                      </a:solidFill>
-                      <a:prstDash val="solid"/>
-                      <a:round/>
-                      <a:headEnd type="none" w="med" len="med"/>
-                      <a:tailEnd type="none" w="med" len="med"/>
-                    </a:lnL>
-                    <a:lnR w="12700" cap="flat" cmpd="sng" algn="ctr">
-                      <a:solidFill>
-                        <a:schemeClr val="tx1"/>
-                      </a:solidFill>
-                      <a:prstDash val="solid"/>
-                      <a:round/>
-                      <a:headEnd type="none" w="med" len="med"/>
-                      <a:tailEnd type="none" w="med" len="med"/>
-                    </a:lnR>
-                    <a:lnT w="12700" cmpd="sng">
-                      <a:solidFill>
-                        <a:schemeClr val="tx1"/>
-                      </a:solidFill>
-                      <a:prstDash val="solid"/>
-                    </a:lnT>
-                    <a:lnB w="12700" cap="flat" cmpd="sng" algn="ctr">
-                      <a:solidFill>
-                        <a:schemeClr val="tx1"/>
-                      </a:solidFill>
-                      <a:prstDash val="solid"/>
-                      <a:round/>
-                      <a:headEnd type="none" w="med" len="med"/>
-                      <a:tailEnd type="none" w="med" len="med"/>
-                    </a:lnB>
-                  </a:tcPr>
-                </a:tc>
-                <a:tc>
-                  <a:txBody>
-                    <a:bodyPr/>
-                    <a:lstStyle/>
-                    <a:p>
-                      <a:r>
-                        <a:rPr lang="en-US" dirty="0"/>
-                        <a:t>Int</a:t>
-                      </a:r>
-                    </a:p>
-                  </a:txBody>
-                  <a:tcPr>
-                    <a:lnL w="12700" cap="flat" cmpd="sng" algn="ctr">
-                      <a:solidFill>
-                        <a:schemeClr val="tx1"/>
-                      </a:solidFill>
-                      <a:prstDash val="solid"/>
-                      <a:round/>
-                      <a:headEnd type="none" w="med" len="med"/>
-                      <a:tailEnd type="none" w="med" len="med"/>
-                    </a:lnL>
-                    <a:lnR w="12700" cmpd="sng">
-                      <a:solidFill>
-                        <a:schemeClr val="tx1"/>
-                      </a:solidFill>
-                      <a:prstDash val="solid"/>
-                    </a:lnR>
-                    <a:lnT w="12700" cap="flat" cmpd="sng" algn="ctr">
-                      <a:solidFill>
-                        <a:schemeClr val="tx1"/>
-                      </a:solidFill>
-                      <a:prstDash val="solid"/>
-                      <a:round/>
-                      <a:headEnd type="none" w="med" len="med"/>
-                      <a:tailEnd type="none" w="med" len="med"/>
-                    </a:lnT>
-                    <a:lnB w="12700" cap="flat" cmpd="sng" algn="ctr">
-                      <a:solidFill>
-                        <a:schemeClr val="tx1"/>
-                      </a:solidFill>
-                      <a:prstDash val="solid"/>
-                      <a:round/>
-                      <a:headEnd type="none" w="med" len="med"/>
-                      <a:tailEnd type="none" w="med" len="med"/>
-                    </a:lnB>
-                  </a:tcPr>
-                </a:tc>
-                <a:extLst>
-                  <a:ext uri="{0D108BD9-81ED-4DB2-BD59-A6C34878D82A}">
-                    <a16:rowId xmlns:a16="http://schemas.microsoft.com/office/drawing/2014/main" val="2798257090"/>
-                  </a:ext>
-                </a:extLst>
-              </a:tr>
-              <a:tr h="179084">
-                <a:tc>
-                  <a:txBody>
-                    <a:bodyPr/>
-                    <a:lstStyle/>
-                    <a:p>
-                      <a:r>
-                        <a:rPr lang="en-US" dirty="0"/>
-                        <a:t>Name</a:t>
-                      </a:r>
-                    </a:p>
-                  </a:txBody>
-                  <a:tcPr>
-                    <a:lnL w="12700" cap="flat" cmpd="sng" algn="ctr">
-                      <a:solidFill>
-                        <a:schemeClr val="tx1"/>
-                      </a:solidFill>
-                      <a:prstDash val="solid"/>
-                      <a:round/>
-                      <a:headEnd type="none" w="med" len="med"/>
-                      <a:tailEnd type="none" w="med" len="med"/>
-                    </a:lnL>
-                    <a:lnR w="12700" cap="flat" cmpd="sng" algn="ctr">
-                      <a:solidFill>
-                        <a:schemeClr val="tx1"/>
-                      </a:solidFill>
-                      <a:prstDash val="solid"/>
-                      <a:round/>
-                      <a:headEnd type="none" w="med" len="med"/>
-                      <a:tailEnd type="none" w="med" len="med"/>
-                    </a:lnR>
-                    <a:lnT w="12700" cmpd="sng">
-                      <a:solidFill>
-                        <a:schemeClr val="tx1"/>
-                      </a:solidFill>
-                      <a:prstDash val="solid"/>
-                    </a:lnT>
-                    <a:lnB w="12700" cap="flat" cmpd="sng" algn="ctr">
-                      <a:solidFill>
-                        <a:schemeClr val="tx1"/>
-                      </a:solidFill>
-                      <a:prstDash val="solid"/>
-                      <a:round/>
-                      <a:headEnd type="none" w="med" len="med"/>
-                      <a:tailEnd type="none" w="med" len="med"/>
-                    </a:lnB>
-                  </a:tcPr>
-                </a:tc>
-                <a:tc>
-                  <a:txBody>
-                    <a:bodyPr/>
-                    <a:lstStyle/>
-                    <a:p>
-                      <a:r>
-                        <a:rPr lang="en-US" dirty="0"/>
-                        <a:t>Varchar</a:t>
-                      </a:r>
-                    </a:p>
-                  </a:txBody>
-                  <a:tcPr>
-                    <a:lnL w="12700" cap="flat" cmpd="sng" algn="ctr">
-                      <a:solidFill>
-                        <a:schemeClr val="tx1"/>
-                      </a:solidFill>
-                      <a:prstDash val="solid"/>
-                      <a:round/>
-                      <a:headEnd type="none" w="med" len="med"/>
-                      <a:tailEnd type="none" w="med" len="med"/>
-                    </a:lnL>
-                    <a:lnR w="12700" cmpd="sng">
-                      <a:solidFill>
-                        <a:schemeClr val="tx1"/>
-                      </a:solidFill>
-                      <a:prstDash val="solid"/>
-                    </a:lnR>
-                    <a:lnT w="12700" cap="flat" cmpd="sng" algn="ctr">
-                      <a:solidFill>
-                        <a:schemeClr val="tx1"/>
-                      </a:solidFill>
-                      <a:prstDash val="solid"/>
-                      <a:round/>
-                      <a:headEnd type="none" w="med" len="med"/>
-                      <a:tailEnd type="none" w="med" len="med"/>
-                    </a:lnT>
-                    <a:lnB w="12700" cap="flat" cmpd="sng" algn="ctr">
-                      <a:solidFill>
-                        <a:schemeClr val="tx1"/>
-                      </a:solidFill>
-                      <a:prstDash val="solid"/>
-                      <a:round/>
-                      <a:headEnd type="none" w="med" len="med"/>
-                      <a:tailEnd type="none" w="med" len="med"/>
-                    </a:lnB>
-                  </a:tcPr>
-                </a:tc>
-                <a:extLst>
-                  <a:ext uri="{0D108BD9-81ED-4DB2-BD59-A6C34878D82A}">
-                    <a16:rowId xmlns:a16="http://schemas.microsoft.com/office/drawing/2014/main" val="3556679216"/>
-                  </a:ext>
-                </a:extLst>
-              </a:tr>
-              <a:tr h="179084">
-                <a:tc>
-                  <a:txBody>
-                    <a:bodyPr/>
-                    <a:lstStyle/>
-                    <a:p>
-                      <a:r>
-                        <a:rPr lang="en-US" dirty="0"/>
-                        <a:t>Description</a:t>
-                      </a:r>
-                    </a:p>
-                  </a:txBody>
-                  <a:tcPr>
-                    <a:lnL w="12700" cap="flat" cmpd="sng" algn="ctr">
-                      <a:solidFill>
-                        <a:schemeClr val="tx1"/>
-                      </a:solidFill>
-                      <a:prstDash val="solid"/>
-                      <a:round/>
-                      <a:headEnd type="none" w="med" len="med"/>
-                      <a:tailEnd type="none" w="med" len="med"/>
-                    </a:lnL>
-                    <a:lnR w="12700" cap="flat" cmpd="sng" algn="ctr">
-                      <a:solidFill>
-                        <a:schemeClr val="tx1"/>
-                      </a:solidFill>
-                      <a:prstDash val="solid"/>
-                      <a:round/>
-                      <a:headEnd type="none" w="med" len="med"/>
-                      <a:tailEnd type="none" w="med" len="med"/>
-                    </a:lnR>
-                    <a:lnT w="12700" cmpd="sng">
-                      <a:solidFill>
-                        <a:schemeClr val="tx1"/>
-                      </a:solidFill>
-                      <a:prstDash val="solid"/>
-                    </a:lnT>
-                    <a:lnB w="12700" cap="flat" cmpd="sng" algn="ctr">
-                      <a:solidFill>
-                        <a:schemeClr val="tx1"/>
-                      </a:solidFill>
-                      <a:prstDash val="solid"/>
-                      <a:round/>
-                      <a:headEnd type="none" w="med" len="med"/>
-                      <a:tailEnd type="none" w="med" len="med"/>
-                    </a:lnB>
-                  </a:tcPr>
-                </a:tc>
-                <a:tc>
-                  <a:txBody>
-                    <a:bodyPr/>
-                    <a:lstStyle/>
-                    <a:p>
-                      <a:r>
-                        <a:rPr lang="en-US" dirty="0"/>
-                        <a:t>Varchar</a:t>
-                      </a:r>
-                    </a:p>
-                  </a:txBody>
-                  <a:tcPr>
-                    <a:lnL w="12700" cap="flat" cmpd="sng" algn="ctr">
-                      <a:solidFill>
-                        <a:schemeClr val="tx1"/>
-                      </a:solidFill>
-                      <a:prstDash val="solid"/>
-                      <a:round/>
-                      <a:headEnd type="none" w="med" len="med"/>
-                      <a:tailEnd type="none" w="med" len="med"/>
-                    </a:lnL>
-                    <a:lnR w="12700" cmpd="sng">
-                      <a:solidFill>
-                        <a:schemeClr val="tx1"/>
-                      </a:solidFill>
-                      <a:prstDash val="solid"/>
-                    </a:lnR>
-                    <a:lnT w="12700" cap="flat" cmpd="sng" algn="ctr">
-                      <a:solidFill>
-                        <a:schemeClr val="tx1"/>
-                      </a:solidFill>
-                      <a:prstDash val="solid"/>
-                      <a:round/>
-                      <a:headEnd type="none" w="med" len="med"/>
-                      <a:tailEnd type="none" w="med" len="med"/>
-                    </a:lnT>
-                    <a:lnB w="12700" cap="flat" cmpd="sng" algn="ctr">
-                      <a:solidFill>
-                        <a:schemeClr val="tx1"/>
-                      </a:solidFill>
-                      <a:prstDash val="solid"/>
-                      <a:round/>
-                      <a:headEnd type="none" w="med" len="med"/>
-                      <a:tailEnd type="none" w="med" len="med"/>
-                    </a:lnB>
-                  </a:tcPr>
-                </a:tc>
-                <a:extLst>
-                  <a:ext uri="{0D108BD9-81ED-4DB2-BD59-A6C34878D82A}">
-                    <a16:rowId xmlns:a16="http://schemas.microsoft.com/office/drawing/2014/main" val="1824085793"/>
-                  </a:ext>
-                </a:extLst>
-              </a:tr>
-              <a:tr h="179084">
-                <a:tc>
-                  <a:txBody>
-                    <a:bodyPr/>
-                    <a:lstStyle/>
-                    <a:p>
-                      <a:r>
-                        <a:rPr lang="en-US" dirty="0"/>
-                        <a:t>Payout</a:t>
-                      </a:r>
-                    </a:p>
-                  </a:txBody>
-                  <a:tcPr>
-                    <a:lnL w="12700" cap="flat" cmpd="sng" algn="ctr">
-                      <a:solidFill>
-                        <a:schemeClr val="tx1"/>
-                      </a:solidFill>
-                      <a:prstDash val="solid"/>
-                      <a:round/>
-                      <a:headEnd type="none" w="med" len="med"/>
-                      <a:tailEnd type="none" w="med" len="med"/>
-                    </a:lnL>
-                    <a:lnR w="12700" cap="flat" cmpd="sng" algn="ctr">
-                      <a:solidFill>
-                        <a:schemeClr val="tx1"/>
-                      </a:solidFill>
-                      <a:prstDash val="solid"/>
-                      <a:round/>
-                      <a:headEnd type="none" w="med" len="med"/>
-                      <a:tailEnd type="none" w="med" len="med"/>
-                    </a:lnR>
-                    <a:lnT w="12700" cmpd="sng">
-                      <a:solidFill>
-                        <a:schemeClr val="tx1"/>
-                      </a:solidFill>
-                      <a:prstDash val="solid"/>
-                    </a:lnT>
-                    <a:lnB w="12700" cap="flat" cmpd="sng" algn="ctr">
-                      <a:solidFill>
-                        <a:schemeClr val="tx1"/>
-                      </a:solidFill>
-                      <a:prstDash val="solid"/>
-                      <a:round/>
-                      <a:headEnd type="none" w="med" len="med"/>
-                      <a:tailEnd type="none" w="med" len="med"/>
-                    </a:lnB>
-                  </a:tcPr>
-                </a:tc>
-                <a:tc>
-                  <a:txBody>
-                    <a:bodyPr/>
-                    <a:lstStyle/>
-                    <a:p>
-                      <a:r>
-                        <a:rPr lang="en-US" dirty="0"/>
-                        <a:t>Int</a:t>
-                      </a:r>
-                    </a:p>
-                  </a:txBody>
-                  <a:tcPr>
-                    <a:lnL w="12700" cap="flat" cmpd="sng" algn="ctr">
-                      <a:solidFill>
-                        <a:schemeClr val="tx1"/>
-                      </a:solidFill>
-                      <a:prstDash val="solid"/>
-                      <a:round/>
-                      <a:headEnd type="none" w="med" len="med"/>
-                      <a:tailEnd type="none" w="med" len="med"/>
-                    </a:lnL>
-                    <a:lnR w="12700" cmpd="sng">
-                      <a:solidFill>
-                        <a:schemeClr val="tx1"/>
-                      </a:solidFill>
-                      <a:prstDash val="solid"/>
-                    </a:lnR>
-                    <a:lnT w="12700" cap="flat" cmpd="sng" algn="ctr">
-                      <a:solidFill>
-                        <a:schemeClr val="tx1"/>
-                      </a:solidFill>
-                      <a:prstDash val="solid"/>
-                      <a:round/>
-                      <a:headEnd type="none" w="med" len="med"/>
-                      <a:tailEnd type="none" w="med" len="med"/>
-                    </a:lnT>
-                    <a:lnB w="12700" cap="flat" cmpd="sng" algn="ctr">
-                      <a:solidFill>
-                        <a:schemeClr val="tx1"/>
-                      </a:solidFill>
-                      <a:prstDash val="solid"/>
-                      <a:round/>
-                      <a:headEnd type="none" w="med" len="med"/>
-                      <a:tailEnd type="none" w="med" len="med"/>
-                    </a:lnB>
-                  </a:tcPr>
-                </a:tc>
-                <a:extLst>
-                  <a:ext uri="{0D108BD9-81ED-4DB2-BD59-A6C34878D82A}">
-                    <a16:rowId xmlns:a16="http://schemas.microsoft.com/office/drawing/2014/main" val="2589299938"/>
-                  </a:ext>
-                </a:extLst>
-              </a:tr>
-              <a:tr h="179084">
-                <a:tc>
-                  <a:txBody>
-                    <a:bodyPr/>
-                    <a:lstStyle/>
-                    <a:p>
-                      <a:r>
-                        <a:rPr lang="en-US" dirty="0"/>
-                        <a:t>Status</a:t>
-                      </a:r>
-                    </a:p>
-                  </a:txBody>
-                  <a:tcPr>
-                    <a:lnL w="12700" cap="flat" cmpd="sng" algn="ctr">
-                      <a:solidFill>
-                        <a:schemeClr val="tx1"/>
-                      </a:solidFill>
-                      <a:prstDash val="solid"/>
-                      <a:round/>
-                      <a:headEnd type="none" w="med" len="med"/>
-                      <a:tailEnd type="none" w="med" len="med"/>
-                    </a:lnL>
-                    <a:lnR w="12700" cap="flat" cmpd="sng" algn="ctr">
-                      <a:solidFill>
-                        <a:schemeClr val="tx1"/>
-                      </a:solidFill>
-                      <a:prstDash val="solid"/>
-                      <a:round/>
-                      <a:headEnd type="none" w="med" len="med"/>
-                      <a:tailEnd type="none" w="med" len="med"/>
-                    </a:lnR>
-                    <a:lnT w="12700" cmpd="sng">
-                      <a:solidFill>
-                        <a:schemeClr val="tx1"/>
-                      </a:solidFill>
-                      <a:prstDash val="solid"/>
-                    </a:lnT>
-                    <a:lnB w="12700" cap="flat" cmpd="sng" algn="ctr">
-                      <a:solidFill>
-                        <a:schemeClr val="tx1"/>
-                      </a:solidFill>
-                      <a:prstDash val="solid"/>
-                      <a:round/>
-                      <a:headEnd type="none" w="med" len="med"/>
-                      <a:tailEnd type="none" w="med" len="med"/>
-                    </a:lnB>
-                  </a:tcPr>
-                </a:tc>
-                <a:tc>
-                  <a:txBody>
-                    <a:bodyPr/>
-                    <a:lstStyle/>
-                    <a:p>
-                      <a:r>
-                        <a:rPr lang="en-US" dirty="0"/>
-                        <a:t>Varchar</a:t>
-                      </a:r>
-                    </a:p>
-                  </a:txBody>
-                  <a:tcPr>
-                    <a:lnL w="12700" cap="flat" cmpd="sng" algn="ctr">
-                      <a:solidFill>
-                        <a:schemeClr val="tx1"/>
-                      </a:solidFill>
-                      <a:prstDash val="solid"/>
-                      <a:round/>
-                      <a:headEnd type="none" w="med" len="med"/>
-                      <a:tailEnd type="none" w="med" len="med"/>
-                    </a:lnL>
-                    <a:lnR w="12700" cmpd="sng">
-                      <a:solidFill>
-                        <a:schemeClr val="tx1"/>
-                      </a:solidFill>
-                      <a:prstDash val="solid"/>
-                    </a:lnR>
-                    <a:lnT w="12700" cap="flat" cmpd="sng" algn="ctr">
-                      <a:solidFill>
-                        <a:schemeClr val="tx1"/>
-                      </a:solidFill>
-                      <a:prstDash val="solid"/>
-                      <a:round/>
-                      <a:headEnd type="none" w="med" len="med"/>
-                      <a:tailEnd type="none" w="med" len="med"/>
-                    </a:lnT>
-                    <a:lnB w="12700" cap="flat" cmpd="sng" algn="ctr">
-                      <a:solidFill>
-                        <a:schemeClr val="tx1"/>
-                      </a:solidFill>
-                      <a:prstDash val="solid"/>
-                      <a:round/>
-                      <a:headEnd type="none" w="med" len="med"/>
-                      <a:tailEnd type="none" w="med" len="med"/>
-                    </a:lnB>
-                  </a:tcPr>
-                </a:tc>
-                <a:extLst>
-                  <a:ext uri="{0D108BD9-81ED-4DB2-BD59-A6C34878D82A}">
-                    <a16:rowId xmlns:a16="http://schemas.microsoft.com/office/drawing/2014/main" val="3232717610"/>
-                  </a:ext>
-                </a:extLst>
-              </a:tr>
-              <a:tr h="313397">
-                <a:tc>
-                  <a:txBody>
-                    <a:bodyPr/>
-                    <a:lstStyle/>
-                    <a:p>
-                      <a:r>
-                        <a:rPr lang="en-US" sz="1600" dirty="0"/>
-                        <a:t>Days since completed</a:t>
-                      </a:r>
+                      <a:endParaRPr lang="en-US" dirty="0"/>
                     </a:p>
                   </a:txBody>
                   <a:tcPr>
@@ -6738,108 +5958,7 @@
                 </a:tc>
                 <a:extLst>
                   <a:ext uri="{0D108BD9-81ED-4DB2-BD59-A6C34878D82A}">
-                    <a16:rowId xmlns:a16="http://schemas.microsoft.com/office/drawing/2014/main" val="1721946676"/>
-                  </a:ext>
-                </a:extLst>
-              </a:tr>
-              <a:tr h="313397">
-                <a:tc>
-                  <a:txBody>
-                    <a:bodyPr/>
-                    <a:lstStyle/>
-                    <a:p>
-                      <a:r>
-                        <a:rPr lang="en-US" sz="1600" dirty="0"/>
-                        <a:t>Picture </a:t>
-                      </a:r>
-                    </a:p>
-                  </a:txBody>
-                  <a:tcPr>
-                    <a:lnL w="12700" cap="flat" cmpd="sng" algn="ctr">
-                      <a:solidFill>
-                        <a:schemeClr val="tx1"/>
-                      </a:solidFill>
-                      <a:prstDash val="solid"/>
-                      <a:round/>
-                      <a:headEnd type="none" w="med" len="med"/>
-                      <a:tailEnd type="none" w="med" len="med"/>
-                    </a:lnL>
-                    <a:lnR w="12700" cap="flat" cmpd="sng" algn="ctr">
-                      <a:solidFill>
-                        <a:schemeClr val="tx1"/>
-                      </a:solidFill>
-                      <a:prstDash val="solid"/>
-                      <a:round/>
-                      <a:headEnd type="none" w="med" len="med"/>
-                      <a:tailEnd type="none" w="med" len="med"/>
-                    </a:lnR>
-                    <a:lnT w="12700" cmpd="sng">
-                      <a:solidFill>
-                        <a:schemeClr val="tx1"/>
-                      </a:solidFill>
-                      <a:prstDash val="solid"/>
-                    </a:lnT>
-                    <a:lnB w="12700" cap="flat" cmpd="sng" algn="ctr">
-                      <a:solidFill>
-                        <a:schemeClr val="tx1"/>
-                      </a:solidFill>
-                      <a:prstDash val="solid"/>
-                      <a:round/>
-                      <a:headEnd type="none" w="med" len="med"/>
-                      <a:tailEnd type="none" w="med" len="med"/>
-                    </a:lnB>
-                  </a:tcPr>
-                </a:tc>
-                <a:tc>
-                  <a:txBody>
-                    <a:bodyPr/>
-                    <a:lstStyle/>
-                    <a:p>
-                      <a:r>
-                        <a:rPr lang="en-US" dirty="0"/>
-                        <a:t>picture</a:t>
-                      </a:r>
-                    </a:p>
-                  </a:txBody>
-                  <a:tcPr>
-                    <a:lnL w="12700" cap="flat" cmpd="sng" algn="ctr">
-                      <a:solidFill>
-                        <a:schemeClr val="tx1"/>
-                      </a:solidFill>
-                      <a:prstDash val="solid"/>
-                      <a:round/>
-                      <a:headEnd type="none" w="med" len="med"/>
-                      <a:tailEnd type="none" w="med" len="med"/>
-                    </a:lnL>
-                    <a:lnR w="12700" cmpd="sng">
-                      <a:solidFill>
-                        <a:schemeClr val="tx1"/>
-                      </a:solidFill>
-                      <a:prstDash val="solid"/>
-                    </a:lnR>
-                    <a:lnT w="12700" cap="flat" cmpd="sng" algn="ctr">
-                      <a:solidFill>
-                        <a:schemeClr val="tx1"/>
-                      </a:solidFill>
-                      <a:prstDash val="solid"/>
-                      <a:round/>
-                      <a:headEnd type="none" w="med" len="med"/>
-                      <a:tailEnd type="none" w="med" len="med"/>
-                    </a:lnT>
-                    <a:lnB w="12700" cap="flat" cmpd="sng" algn="ctr">
-                      <a:solidFill>
-                        <a:schemeClr val="tx1"/>
-                      </a:solidFill>
-                      <a:prstDash val="solid"/>
-                      <a:round/>
-                      <a:headEnd type="none" w="med" len="med"/>
-                      <a:tailEnd type="none" w="med" len="med"/>
-                    </a:lnB>
-                  </a:tcPr>
-                </a:tc>
-                <a:extLst>
-                  <a:ext uri="{0D108BD9-81ED-4DB2-BD59-A6C34878D82A}">
-                    <a16:rowId xmlns:a16="http://schemas.microsoft.com/office/drawing/2014/main" val="3160021839"/>
+                    <a16:rowId xmlns:a16="http://schemas.microsoft.com/office/drawing/2014/main" val="3014317094"/>
                   </a:ext>
                 </a:extLst>
               </a:tr>
@@ -6964,47 +6083,6 @@
       </p:cxnSp>
       <p:cxnSp>
         <p:nvCxnSpPr>
-          <p:cNvPr id="54" name="Straight Arrow Connector 53">
-            <a:extLst>
-              <a:ext uri="{FF2B5EF4-FFF2-40B4-BE49-F238E27FC236}">
-                <a16:creationId xmlns:a16="http://schemas.microsoft.com/office/drawing/2014/main" id="{C9B35F92-5DF5-40A7-808F-52DC27A1D61C}"/>
-              </a:ext>
-            </a:extLst>
-          </p:cNvPr>
-          <p:cNvCxnSpPr>
-            <a:cxnSpLocks/>
-          </p:cNvCxnSpPr>
-          <p:nvPr/>
-        </p:nvCxnSpPr>
-        <p:spPr>
-          <a:xfrm flipH="1" flipV="1">
-            <a:off x="4296229" y="1099067"/>
-            <a:ext cx="2467431" cy="3458419"/>
-          </a:xfrm>
-          <a:prstGeom prst="straightConnector1">
-            <a:avLst/>
-          </a:prstGeom>
-          <a:ln>
-            <a:tailEnd type="triangle"/>
-          </a:ln>
-        </p:spPr>
-        <p:style>
-          <a:lnRef idx="1">
-            <a:schemeClr val="dk1"/>
-          </a:lnRef>
-          <a:fillRef idx="0">
-            <a:schemeClr val="dk1"/>
-          </a:fillRef>
-          <a:effectRef idx="0">
-            <a:schemeClr val="dk1"/>
-          </a:effectRef>
-          <a:fontRef idx="minor">
-            <a:schemeClr val="tx1"/>
-          </a:fontRef>
-        </p:style>
-      </p:cxnSp>
-      <p:cxnSp>
-        <p:nvCxnSpPr>
           <p:cNvPr id="59" name="Straight Arrow Connector 58">
             <a:extLst>
               <a:ext uri="{FF2B5EF4-FFF2-40B4-BE49-F238E27FC236}">
@@ -7083,22 +6161,20 @@
       </p:cxnSp>
       <p:cxnSp>
         <p:nvCxnSpPr>
-          <p:cNvPr id="63" name="Straight Arrow Connector 62">
-            <a:extLst>
-              <a:ext uri="{FF2B5EF4-FFF2-40B4-BE49-F238E27FC236}">
-                <a16:creationId xmlns:a16="http://schemas.microsoft.com/office/drawing/2014/main" id="{71A3807B-E654-445E-A835-AE4C333116B4}"/>
-              </a:ext>
-            </a:extLst>
-          </p:cNvPr>
-          <p:cNvCxnSpPr>
-            <a:cxnSpLocks/>
-          </p:cNvCxnSpPr>
+          <p:cNvPr id="8" name="Straight Arrow Connector 7">
+            <a:extLst>
+              <a:ext uri="{FF2B5EF4-FFF2-40B4-BE49-F238E27FC236}">
+                <a16:creationId xmlns:a16="http://schemas.microsoft.com/office/drawing/2014/main" id="{4B0B2EFA-EDF3-4BED-86B9-4326B446887B}"/>
+              </a:ext>
+            </a:extLst>
+          </p:cNvPr>
+          <p:cNvCxnSpPr/>
           <p:nvPr/>
         </p:nvCxnSpPr>
         <p:spPr>
           <a:xfrm flipV="1">
-            <a:off x="4296228" y="4649821"/>
-            <a:ext cx="2467430" cy="1036542"/>
+            <a:off x="4296227" y="3251199"/>
+            <a:ext cx="2467431" cy="478972"/>
           </a:xfrm>
           <a:prstGeom prst="straightConnector1">
             <a:avLst/>

</xml_diff>